<commit_message>
ptt e modelo logico
</commit_message>
<xml_diff>
--- a/Documentação/Apresentação Sprint 2.pptx
+++ b/Documentação/Apresentação Sprint 2.pptx
@@ -2474,7 +2474,7 @@
           <a:p>
             <a:fld id="{1F9606BC-5244-47D9-93DD-4B4F41B61F0A}" type="datetimeFigureOut">
               <a:rPr lang="pt-BR" smtClean="0"/>
-              <a:t>26/10/2020</a:t>
+              <a:t>27/10/2020</a:t>
             </a:fld>
             <a:endParaRPr lang="pt-BR"/>
           </a:p>
@@ -2672,7 +2672,7 @@
           <a:p>
             <a:fld id="{1F9606BC-5244-47D9-93DD-4B4F41B61F0A}" type="datetimeFigureOut">
               <a:rPr lang="pt-BR" smtClean="0"/>
-              <a:t>26/10/2020</a:t>
+              <a:t>27/10/2020</a:t>
             </a:fld>
             <a:endParaRPr lang="pt-BR"/>
           </a:p>
@@ -2880,7 +2880,7 @@
           <a:p>
             <a:fld id="{1F9606BC-5244-47D9-93DD-4B4F41B61F0A}" type="datetimeFigureOut">
               <a:rPr lang="pt-BR" smtClean="0"/>
-              <a:t>26/10/2020</a:t>
+              <a:t>27/10/2020</a:t>
             </a:fld>
             <a:endParaRPr lang="pt-BR"/>
           </a:p>
@@ -3078,7 +3078,7 @@
           <a:p>
             <a:fld id="{1F9606BC-5244-47D9-93DD-4B4F41B61F0A}" type="datetimeFigureOut">
               <a:rPr lang="pt-BR" smtClean="0"/>
-              <a:t>26/10/2020</a:t>
+              <a:t>27/10/2020</a:t>
             </a:fld>
             <a:endParaRPr lang="pt-BR"/>
           </a:p>
@@ -3353,7 +3353,7 @@
           <a:p>
             <a:fld id="{1F9606BC-5244-47D9-93DD-4B4F41B61F0A}" type="datetimeFigureOut">
               <a:rPr lang="pt-BR" smtClean="0"/>
-              <a:t>26/10/2020</a:t>
+              <a:t>27/10/2020</a:t>
             </a:fld>
             <a:endParaRPr lang="pt-BR"/>
           </a:p>
@@ -3618,7 +3618,7 @@
           <a:p>
             <a:fld id="{1F9606BC-5244-47D9-93DD-4B4F41B61F0A}" type="datetimeFigureOut">
               <a:rPr lang="pt-BR" smtClean="0"/>
-              <a:t>26/10/2020</a:t>
+              <a:t>27/10/2020</a:t>
             </a:fld>
             <a:endParaRPr lang="pt-BR"/>
           </a:p>
@@ -4030,7 +4030,7 @@
           <a:p>
             <a:fld id="{1F9606BC-5244-47D9-93DD-4B4F41B61F0A}" type="datetimeFigureOut">
               <a:rPr lang="pt-BR" smtClean="0"/>
-              <a:t>26/10/2020</a:t>
+              <a:t>27/10/2020</a:t>
             </a:fld>
             <a:endParaRPr lang="pt-BR"/>
           </a:p>
@@ -4171,7 +4171,7 @@
           <a:p>
             <a:fld id="{1F9606BC-5244-47D9-93DD-4B4F41B61F0A}" type="datetimeFigureOut">
               <a:rPr lang="pt-BR" smtClean="0"/>
-              <a:t>26/10/2020</a:t>
+              <a:t>27/10/2020</a:t>
             </a:fld>
             <a:endParaRPr lang="pt-BR"/>
           </a:p>
@@ -4284,7 +4284,7 @@
           <a:p>
             <a:fld id="{1F9606BC-5244-47D9-93DD-4B4F41B61F0A}" type="datetimeFigureOut">
               <a:rPr lang="pt-BR" smtClean="0"/>
-              <a:t>26/10/2020</a:t>
+              <a:t>27/10/2020</a:t>
             </a:fld>
             <a:endParaRPr lang="pt-BR"/>
           </a:p>
@@ -4595,7 +4595,7 @@
           <a:p>
             <a:fld id="{1F9606BC-5244-47D9-93DD-4B4F41B61F0A}" type="datetimeFigureOut">
               <a:rPr lang="pt-BR" smtClean="0"/>
-              <a:t>26/10/2020</a:t>
+              <a:t>27/10/2020</a:t>
             </a:fld>
             <a:endParaRPr lang="pt-BR"/>
           </a:p>
@@ -4883,7 +4883,7 @@
           <a:p>
             <a:fld id="{1F9606BC-5244-47D9-93DD-4B4F41B61F0A}" type="datetimeFigureOut">
               <a:rPr lang="pt-BR" smtClean="0"/>
-              <a:t>26/10/2020</a:t>
+              <a:t>27/10/2020</a:t>
             </a:fld>
             <a:endParaRPr lang="pt-BR"/>
           </a:p>
@@ -5124,7 +5124,7 @@
           <a:p>
             <a:fld id="{1F9606BC-5244-47D9-93DD-4B4F41B61F0A}" type="datetimeFigureOut">
               <a:rPr lang="pt-BR" smtClean="0"/>
-              <a:t>26/10/2020</a:t>
+              <a:t>27/10/2020</a:t>
             </a:fld>
             <a:endParaRPr lang="pt-BR"/>
           </a:p>
@@ -6716,7 +6716,7 @@
               <a:rPr lang="pt-BR" sz="4000" dirty="0">
                 <a:latin typeface="Felix Titling" panose="04060505060202020A04" pitchFamily="82" charset="0"/>
               </a:rPr>
-              <a:t> a</a:t>
+              <a:t> </a:t>
             </a:r>
           </a:p>
         </p:txBody>
@@ -8277,6 +8277,16 @@
 <file path=ppt/slides/slide2.xml><?xml version="1.0" encoding="utf-8"?>
 <p:sld xmlns:a="http://schemas.openxmlformats.org/drawingml/2006/main" xmlns:r="http://schemas.openxmlformats.org/officeDocument/2006/relationships" xmlns:p="http://schemas.openxmlformats.org/presentationml/2006/main">
   <p:cSld>
+    <p:bg>
+      <p:bgPr>
+        <a:solidFill>
+          <a:schemeClr val="bg2">
+            <a:lumMod val="90000"/>
+          </a:schemeClr>
+        </a:solidFill>
+        <a:effectLst/>
+      </p:bgPr>
+    </p:bg>
     <p:spTree>
       <p:nvGrpSpPr>
         <p:cNvPr id="1" name=""/>
@@ -8293,10 +8303,10 @@
       </p:grpSpPr>
       <p:sp>
         <p:nvSpPr>
-          <p:cNvPr id="11" name="Retângulo 10">
-            <a:extLst>
-              <a:ext uri="{FF2B5EF4-FFF2-40B4-BE49-F238E27FC236}">
-                <a16:creationId xmlns:a16="http://schemas.microsoft.com/office/drawing/2014/main" id="{958D7C57-67A8-40A6-9C8A-F97FDC0747FC}"/>
+          <p:cNvPr id="2" name="Retângulo 1">
+            <a:extLst>
+              <a:ext uri="{FF2B5EF4-FFF2-40B4-BE49-F238E27FC236}">
+                <a16:creationId xmlns:a16="http://schemas.microsoft.com/office/drawing/2014/main" id="{1CC934F3-2EB8-4EC7-A8CD-FAEB831A3F77}"/>
               </a:ext>
             </a:extLst>
           </p:cNvPr>
@@ -8305,62 +8315,7 @@
         </p:nvSpPr>
         <p:spPr>
           <a:xfrm>
-            <a:off x="0" y="0"/>
-            <a:ext cx="12192001" cy="6858000"/>
-          </a:xfrm>
-          <a:prstGeom prst="rect">
-            <a:avLst/>
-          </a:prstGeom>
-          <a:solidFill>
-            <a:schemeClr val="bg2">
-              <a:lumMod val="50000"/>
-              <a:alpha val="38000"/>
-            </a:schemeClr>
-          </a:solidFill>
-          <a:ln>
-            <a:noFill/>
-          </a:ln>
-        </p:spPr>
-        <p:style>
-          <a:lnRef idx="2">
-            <a:schemeClr val="accent1">
-              <a:shade val="50000"/>
-            </a:schemeClr>
-          </a:lnRef>
-          <a:fillRef idx="1">
-            <a:schemeClr val="accent1"/>
-          </a:fillRef>
-          <a:effectRef idx="0">
-            <a:schemeClr val="accent1"/>
-          </a:effectRef>
-          <a:fontRef idx="minor">
-            <a:schemeClr val="lt1"/>
-          </a:fontRef>
-        </p:style>
-        <p:txBody>
-          <a:bodyPr rtlCol="0" anchor="ctr"/>
-          <a:lstStyle/>
-          <a:p>
-            <a:pPr algn="ctr"/>
-            <a:endParaRPr lang="pt-BR" u="sng" dirty="0"/>
-          </a:p>
-        </p:txBody>
-      </p:sp>
-      <p:sp>
-        <p:nvSpPr>
-          <p:cNvPr id="2" name="Retângulo 1">
-            <a:extLst>
-              <a:ext uri="{FF2B5EF4-FFF2-40B4-BE49-F238E27FC236}">
-                <a16:creationId xmlns:a16="http://schemas.microsoft.com/office/drawing/2014/main" id="{1CC934F3-2EB8-4EC7-A8CD-FAEB831A3F77}"/>
-              </a:ext>
-            </a:extLst>
-          </p:cNvPr>
-          <p:cNvSpPr/>
-          <p:nvPr/>
-        </p:nvSpPr>
-        <p:spPr>
-          <a:xfrm>
-            <a:off x="0" y="1659835"/>
+            <a:off x="67649" y="1659835"/>
             <a:ext cx="12192000" cy="3538330"/>
           </a:xfrm>
           <a:prstGeom prst="rect">
@@ -8438,42 +8393,6 @@
           </a:p>
         </p:txBody>
       </p:sp>
-      <p:pic>
-        <p:nvPicPr>
-          <p:cNvPr id="6" name="Imagem 5" descr="Logotipo&#10;&#10;Descrição gerada automaticamente">
-            <a:extLst>
-              <a:ext uri="{FF2B5EF4-FFF2-40B4-BE49-F238E27FC236}">
-                <a16:creationId xmlns:a16="http://schemas.microsoft.com/office/drawing/2014/main" id="{E9745B06-DB44-4516-8F12-97F363EAFDFB}"/>
-              </a:ext>
-            </a:extLst>
-          </p:cNvPr>
-          <p:cNvPicPr>
-            <a:picLocks noChangeAspect="1"/>
-          </p:cNvPicPr>
-          <p:nvPr/>
-        </p:nvPicPr>
-        <p:blipFill>
-          <a:blip r:embed="rId2">
-            <a:extLst>
-              <a:ext uri="{28A0092B-C50C-407E-A947-70E740481C1C}">
-                <a14:useLocalDpi xmlns:a14="http://schemas.microsoft.com/office/drawing/2010/main" val="0"/>
-              </a:ext>
-            </a:extLst>
-          </a:blip>
-          <a:stretch>
-            <a:fillRect/>
-          </a:stretch>
-        </p:blipFill>
-        <p:spPr>
-          <a:xfrm>
-            <a:off x="11702357" y="4783662"/>
-            <a:ext cx="421994" cy="414503"/>
-          </a:xfrm>
-          <a:prstGeom prst="rect">
-            <a:avLst/>
-          </a:prstGeom>
-        </p:spPr>
-      </p:pic>
       <p:sp>
         <p:nvSpPr>
           <p:cNvPr id="7" name="Elipse 6">
@@ -8790,7 +8709,7 @@
         <p:spPr>
           <a:xfrm>
             <a:off x="292426" y="1958297"/>
-            <a:ext cx="6494267" cy="2677656"/>
+            <a:ext cx="6494267" cy="3416320"/>
           </a:xfrm>
           <a:prstGeom prst="rect">
             <a:avLst/>
@@ -8812,26 +8731,14 @@
                 <a:solidFill>
                   <a:schemeClr val="bg1"/>
                 </a:solidFill>
-              </a:rPr>
-              <a:t>A empresa: </a:t>
-            </a:r>
-            <a:r>
-              <a:rPr lang="pt-BR" sz="2400" dirty="0">
-                <a:solidFill>
-                  <a:schemeClr val="bg1"/>
-                </a:solidFill>
                 <a:latin typeface="Calibri" panose="020F0502020204030204" pitchFamily="34" charset="0"/>
                 <a:ea typeface="Calibri" panose="020F0502020204030204" pitchFamily="34" charset="0"/>
                 <a:cs typeface="Times New Roman" panose="02020603050405020304" pitchFamily="18" charset="0"/>
               </a:rPr>
-              <a:t>Harbor solutions é uma empresa de soluções portuárias com foco na logística, importação e exportação.</a:t>
+              <a:t>Objetivos da empresa.</a:t>
             </a:r>
           </a:p>
           <a:p>
-            <a:pPr marL="342900" indent="-342900">
-              <a:buFont typeface="Arial" panose="020B0604020202020204" pitchFamily="34" charset="0"/>
-              <a:buChar char="•"/>
-            </a:pPr>
             <a:endParaRPr lang="pt-BR" sz="2400" dirty="0">
               <a:solidFill>
                 <a:schemeClr val="bg1"/>
@@ -8854,27 +8761,127 @@
                 <a:ea typeface="Calibri" panose="020F0502020204030204" pitchFamily="34" charset="0"/>
                 <a:cs typeface="Arial" panose="020B0604020202020204" pitchFamily="34" charset="0"/>
               </a:rPr>
-              <a:t>Controle de temperatura nos transportes marítimos com foco no peixes polaca e panga.</a:t>
+              <a:t>Controle de temperatura.</a:t>
             </a:r>
+          </a:p>
+          <a:p>
+            <a:pPr marL="342900" indent="-342900">
+              <a:buFont typeface="Arial" panose="020B0604020202020204" pitchFamily="34" charset="0"/>
+              <a:buChar char="•"/>
+            </a:pPr>
+            <a:endParaRPr lang="pt-BR" sz="2400" dirty="0">
+              <a:solidFill>
+                <a:srgbClr val="EBEBEB"/>
+              </a:solidFill>
+              <a:latin typeface="Felix Titling" panose="04060505060202020A04" pitchFamily="82" charset="0"/>
+              <a:ea typeface="MS Mincho" panose="020B0400000000000000" pitchFamily="49" charset="-128"/>
+              <a:cs typeface="Arial" panose="020B0604020202020204" pitchFamily="34" charset="0"/>
+            </a:endParaRPr>
+          </a:p>
+          <a:p>
+            <a:pPr marL="342900" indent="-342900">
+              <a:buFont typeface="Arial" panose="020B0604020202020204" pitchFamily="34" charset="0"/>
+              <a:buChar char="•"/>
+            </a:pPr>
+            <a:r>
+              <a:rPr lang="pt-BR" sz="2400" dirty="0">
+                <a:solidFill>
+                  <a:schemeClr val="bg1"/>
+                </a:solidFill>
+                <a:ea typeface="MS Mincho" panose="020B0400000000000000" pitchFamily="49" charset="-128"/>
+              </a:rPr>
+              <a:t> Peixes.</a:t>
+            </a:r>
+          </a:p>
+          <a:p>
+            <a:pPr marL="342900" indent="-342900">
+              <a:buFont typeface="Arial" panose="020B0604020202020204" pitchFamily="34" charset="0"/>
+              <a:buChar char="•"/>
+            </a:pPr>
             <a:endParaRPr lang="pt-BR" sz="2400" dirty="0">
               <a:solidFill>
                 <a:schemeClr val="bg1"/>
               </a:solidFill>
-              <a:ea typeface="Calibri" panose="020F0502020204030204" pitchFamily="34" charset="0"/>
-              <a:cs typeface="Times New Roman" panose="02020603050405020304" pitchFamily="18" charset="0"/>
+              <a:ea typeface="MS Mincho" panose="020B0400000000000000" pitchFamily="49" charset="-128"/>
             </a:endParaRPr>
           </a:p>
           <a:p>
+            <a:pPr marL="342900" indent="-342900">
+              <a:buFont typeface="Arial" panose="020B0604020202020204" pitchFamily="34" charset="0"/>
+              <a:buChar char="•"/>
+            </a:pPr>
+            <a:r>
+              <a:rPr lang="pt-BR" sz="2400" dirty="0">
+                <a:solidFill>
+                  <a:schemeClr val="bg1"/>
+                </a:solidFill>
+                <a:ea typeface="MS Mincho" panose="020B0400000000000000" pitchFamily="49" charset="-128"/>
+              </a:rPr>
+              <a:t> Sensores.</a:t>
+            </a:r>
+          </a:p>
+          <a:p>
+            <a:pPr marL="342900" indent="-342900">
+              <a:buFont typeface="Arial" panose="020B0604020202020204" pitchFamily="34" charset="0"/>
+              <a:buChar char="•"/>
+            </a:pPr>
             <a:endParaRPr lang="pt-BR" sz="2400" dirty="0">
               <a:solidFill>
                 <a:schemeClr val="bg1"/>
               </a:solidFill>
-              <a:latin typeface="Felix Titling" panose="04060505060202020A04" pitchFamily="82" charset="0"/>
               <a:ea typeface="MS Mincho" panose="020B0400000000000000" pitchFamily="49" charset="-128"/>
             </a:endParaRPr>
           </a:p>
+          <a:p>
+            <a:pPr marL="342900" indent="-342900">
+              <a:buFont typeface="Arial" panose="020B0604020202020204" pitchFamily="34" charset="0"/>
+              <a:buChar char="•"/>
+            </a:pPr>
+            <a:endParaRPr lang="pt-BR" sz="2400" dirty="0">
+              <a:solidFill>
+                <a:schemeClr val="bg1"/>
+              </a:solidFill>
+              <a:ea typeface="MS Mincho" panose="020B0400000000000000" pitchFamily="49" charset="-128"/>
+            </a:endParaRPr>
+          </a:p>
         </p:txBody>
       </p:sp>
+      <p:pic>
+        <p:nvPicPr>
+          <p:cNvPr id="10" name="Imagem 9" descr="Logotipo&#10;&#10;Descrição gerada automaticamente">
+            <a:extLst>
+              <a:ext uri="{FF2B5EF4-FFF2-40B4-BE49-F238E27FC236}">
+                <a16:creationId xmlns:a16="http://schemas.microsoft.com/office/drawing/2014/main" id="{96921D37-FFF6-4B4B-AC70-D2250BB9B1D4}"/>
+              </a:ext>
+            </a:extLst>
+          </p:cNvPr>
+          <p:cNvPicPr>
+            <a:picLocks noChangeAspect="1"/>
+          </p:cNvPicPr>
+          <p:nvPr/>
+        </p:nvPicPr>
+        <p:blipFill>
+          <a:blip r:embed="rId2">
+            <a:extLst>
+              <a:ext uri="{28A0092B-C50C-407E-A947-70E740481C1C}">
+                <a14:useLocalDpi xmlns:a14="http://schemas.microsoft.com/office/drawing/2010/main" val="0"/>
+              </a:ext>
+            </a:extLst>
+          </a:blip>
+          <a:stretch>
+            <a:fillRect/>
+          </a:stretch>
+        </p:blipFill>
+        <p:spPr>
+          <a:xfrm>
+            <a:off x="11702357" y="4783662"/>
+            <a:ext cx="421994" cy="414503"/>
+          </a:xfrm>
+          <a:prstGeom prst="rect">
+            <a:avLst/>
+          </a:prstGeom>
+        </p:spPr>
+      </p:pic>
     </p:spTree>
     <p:extLst>
       <p:ext uri="{BB962C8B-B14F-4D97-AF65-F5344CB8AC3E}">
@@ -9137,7 +9144,7 @@
                                 </p:cTn>
                               </p:par>
                               <p:par>
-                                <p:cTn id="17" presetID="2" presetClass="entr" presetSubtype="8" fill="hold" nodeType="withEffect">
+                                <p:cTn id="17" presetID="21" presetClass="entr" presetSubtype="2" fill="hold" grpId="0" nodeType="withEffect">
                                   <p:stCondLst>
                                     <p:cond delay="0"/>
                                   </p:stCondLst>
@@ -9150,7 +9157,77 @@
                                           </p:stCondLst>
                                         </p:cTn>
                                         <p:tgtEl>
-                                          <p:spTgt spid="6"/>
+                                          <p:spTgt spid="7"/>
+                                        </p:tgtEl>
+                                        <p:attrNameLst>
+                                          <p:attrName>style.visibility</p:attrName>
+                                        </p:attrNameLst>
+                                      </p:cBhvr>
+                                      <p:to>
+                                        <p:strVal val="visible"/>
+                                      </p:to>
+                                    </p:set>
+                                    <p:animEffect transition="in" filter="wheel(2)">
+                                      <p:cBhvr>
+                                        <p:cTn id="19" dur="1500"/>
+                                        <p:tgtEl>
+                                          <p:spTgt spid="7"/>
+                                        </p:tgtEl>
+                                      </p:cBhvr>
+                                    </p:animEffect>
+                                  </p:childTnLst>
+                                </p:cTn>
+                              </p:par>
+                              <p:par>
+                                <p:cTn id="20" presetID="21" presetClass="entr" presetSubtype="2" fill="hold" grpId="0" nodeType="withEffect">
+                                  <p:stCondLst>
+                                    <p:cond delay="0"/>
+                                  </p:stCondLst>
+                                  <p:childTnLst>
+                                    <p:set>
+                                      <p:cBhvr>
+                                        <p:cTn id="21" dur="1" fill="hold">
+                                          <p:stCondLst>
+                                            <p:cond delay="0"/>
+                                          </p:stCondLst>
+                                        </p:cTn>
+                                        <p:tgtEl>
+                                          <p:spTgt spid="9"/>
+                                        </p:tgtEl>
+                                        <p:attrNameLst>
+                                          <p:attrName>style.visibility</p:attrName>
+                                        </p:attrNameLst>
+                                      </p:cBhvr>
+                                      <p:to>
+                                        <p:strVal val="visible"/>
+                                      </p:to>
+                                    </p:set>
+                                    <p:animEffect transition="in" filter="wheel(2)">
+                                      <p:cBhvr>
+                                        <p:cTn id="22" dur="1500"/>
+                                        <p:tgtEl>
+                                          <p:spTgt spid="9"/>
+                                        </p:tgtEl>
+                                      </p:cBhvr>
+                                    </p:animEffect>
+                                  </p:childTnLst>
+                                </p:cTn>
+                              </p:par>
+                              <p:par>
+                                <p:cTn id="23" presetID="2" presetClass="entr" presetSubtype="8" fill="hold" nodeType="withEffect">
+                                  <p:stCondLst>
+                                    <p:cond delay="0"/>
+                                  </p:stCondLst>
+                                  <p:childTnLst>
+                                    <p:set>
+                                      <p:cBhvr>
+                                        <p:cTn id="24" dur="1" fill="hold">
+                                          <p:stCondLst>
+                                            <p:cond delay="0"/>
+                                          </p:stCondLst>
+                                        </p:cTn>
+                                        <p:tgtEl>
+                                          <p:spTgt spid="10"/>
                                         </p:tgtEl>
                                         <p:attrNameLst>
                                           <p:attrName>style.visibility</p:attrName>
@@ -9162,9 +9239,9 @@
                                     </p:set>
                                     <p:anim calcmode="lin" valueType="num">
                                       <p:cBhvr additive="base">
-                                        <p:cTn id="19" dur="500" fill="hold"/>
+                                        <p:cTn id="25" dur="500" fill="hold"/>
                                         <p:tgtEl>
-                                          <p:spTgt spid="6"/>
+                                          <p:spTgt spid="10"/>
                                         </p:tgtEl>
                                         <p:attrNameLst>
                                           <p:attrName>ppt_x</p:attrName>
@@ -9185,9 +9262,9 @@
                                     </p:anim>
                                     <p:anim calcmode="lin" valueType="num">
                                       <p:cBhvr additive="base">
-                                        <p:cTn id="20" dur="500" fill="hold"/>
+                                        <p:cTn id="26" dur="500" fill="hold"/>
                                         <p:tgtEl>
-                                          <p:spTgt spid="6"/>
+                                          <p:spTgt spid="10"/>
                                         </p:tgtEl>
                                         <p:attrNameLst>
                                           <p:attrName>ppt_y</p:attrName>
@@ -9206,76 +9283,6 @@
                                         </p:tav>
                                       </p:tavLst>
                                     </p:anim>
-                                  </p:childTnLst>
-                                </p:cTn>
-                              </p:par>
-                              <p:par>
-                                <p:cTn id="21" presetID="21" presetClass="entr" presetSubtype="2" fill="hold" grpId="0" nodeType="withEffect">
-                                  <p:stCondLst>
-                                    <p:cond delay="0"/>
-                                  </p:stCondLst>
-                                  <p:childTnLst>
-                                    <p:set>
-                                      <p:cBhvr>
-                                        <p:cTn id="22" dur="1" fill="hold">
-                                          <p:stCondLst>
-                                            <p:cond delay="0"/>
-                                          </p:stCondLst>
-                                        </p:cTn>
-                                        <p:tgtEl>
-                                          <p:spTgt spid="7"/>
-                                        </p:tgtEl>
-                                        <p:attrNameLst>
-                                          <p:attrName>style.visibility</p:attrName>
-                                        </p:attrNameLst>
-                                      </p:cBhvr>
-                                      <p:to>
-                                        <p:strVal val="visible"/>
-                                      </p:to>
-                                    </p:set>
-                                    <p:animEffect transition="in" filter="wheel(2)">
-                                      <p:cBhvr>
-                                        <p:cTn id="23" dur="1500"/>
-                                        <p:tgtEl>
-                                          <p:spTgt spid="7"/>
-                                        </p:tgtEl>
-                                      </p:cBhvr>
-                                    </p:animEffect>
-                                  </p:childTnLst>
-                                </p:cTn>
-                              </p:par>
-                              <p:par>
-                                <p:cTn id="24" presetID="21" presetClass="entr" presetSubtype="2" fill="hold" grpId="0" nodeType="withEffect">
-                                  <p:stCondLst>
-                                    <p:cond delay="0"/>
-                                  </p:stCondLst>
-                                  <p:childTnLst>
-                                    <p:set>
-                                      <p:cBhvr>
-                                        <p:cTn id="25" dur="1" fill="hold">
-                                          <p:stCondLst>
-                                            <p:cond delay="0"/>
-                                          </p:stCondLst>
-                                        </p:cTn>
-                                        <p:tgtEl>
-                                          <p:spTgt spid="9"/>
-                                        </p:tgtEl>
-                                        <p:attrNameLst>
-                                          <p:attrName>style.visibility</p:attrName>
-                                        </p:attrNameLst>
-                                      </p:cBhvr>
-                                      <p:to>
-                                        <p:strVal val="visible"/>
-                                      </p:to>
-                                    </p:set>
-                                    <p:animEffect transition="in" filter="wheel(2)">
-                                      <p:cBhvr>
-                                        <p:cTn id="26" dur="1500"/>
-                                        <p:tgtEl>
-                                          <p:spTgt spid="9"/>
-                                        </p:tgtEl>
-                                      </p:cBhvr>
-                                    </p:animEffect>
                                   </p:childTnLst>
                                 </p:cTn>
                               </p:par>
@@ -9389,36 +9396,6 @@
           </a:p>
         </p:txBody>
       </p:sp>
-      <p:pic>
-        <p:nvPicPr>
-          <p:cNvPr id="5" name="Imagem 4">
-            <a:extLst>
-              <a:ext uri="{FF2B5EF4-FFF2-40B4-BE49-F238E27FC236}">
-                <a16:creationId xmlns:a16="http://schemas.microsoft.com/office/drawing/2014/main" id="{4B8A9233-EF8E-4964-9224-DA8494C772AB}"/>
-              </a:ext>
-            </a:extLst>
-          </p:cNvPr>
-          <p:cNvPicPr>
-            <a:picLocks noChangeAspect="1"/>
-          </p:cNvPicPr>
-          <p:nvPr/>
-        </p:nvPicPr>
-        <p:blipFill>
-          <a:blip r:embed="rId2"/>
-          <a:stretch>
-            <a:fillRect/>
-          </a:stretch>
-        </p:blipFill>
-        <p:spPr>
-          <a:xfrm>
-            <a:off x="921025" y="1891259"/>
-            <a:ext cx="10349948" cy="4029637"/>
-          </a:xfrm>
-          <a:prstGeom prst="rect">
-            <a:avLst/>
-          </a:prstGeom>
-        </p:spPr>
-      </p:pic>
       <p:sp>
         <p:nvSpPr>
           <p:cNvPr id="6" name="CaixaDeTexto 5">
@@ -9472,7 +9449,7 @@
           <p:nvPr/>
         </p:nvPicPr>
         <p:blipFill>
-          <a:blip r:embed="rId3">
+          <a:blip r:embed="rId2">
             <a:extLst>
               <a:ext uri="{28A0092B-C50C-407E-A947-70E740481C1C}">
                 <a14:useLocalDpi xmlns:a14="http://schemas.microsoft.com/office/drawing/2010/main" val="0"/>
@@ -9487,6 +9464,36 @@
           <a:xfrm>
             <a:off x="11555898" y="196738"/>
             <a:ext cx="527310" cy="517950"/>
+          </a:xfrm>
+          <a:prstGeom prst="rect">
+            <a:avLst/>
+          </a:prstGeom>
+        </p:spPr>
+      </p:pic>
+      <p:pic>
+        <p:nvPicPr>
+          <p:cNvPr id="2" name="Imagem 1">
+            <a:extLst>
+              <a:ext uri="{FF2B5EF4-FFF2-40B4-BE49-F238E27FC236}">
+                <a16:creationId xmlns:a16="http://schemas.microsoft.com/office/drawing/2014/main" id="{B6494D76-F17E-4A49-94A8-945A1FD96737}"/>
+              </a:ext>
+            </a:extLst>
+          </p:cNvPr>
+          <p:cNvPicPr>
+            <a:picLocks noChangeAspect="1"/>
+          </p:cNvPicPr>
+          <p:nvPr/>
+        </p:nvPicPr>
+        <p:blipFill>
+          <a:blip r:embed="rId3"/>
+          <a:stretch>
+            <a:fillRect/>
+          </a:stretch>
+        </p:blipFill>
+        <p:spPr>
+          <a:xfrm>
+            <a:off x="126935" y="1796245"/>
+            <a:ext cx="11938127" cy="4167826"/>
           </a:xfrm>
           <a:prstGeom prst="rect">
             <a:avLst/>
@@ -9578,41 +9585,6 @@
                                           </p:stCondLst>
                                         </p:cTn>
                                         <p:tgtEl>
-                                          <p:spTgt spid="5"/>
-                                        </p:tgtEl>
-                                        <p:attrNameLst>
-                                          <p:attrName>style.visibility</p:attrName>
-                                        </p:attrNameLst>
-                                      </p:cBhvr>
-                                      <p:to>
-                                        <p:strVal val="visible"/>
-                                      </p:to>
-                                    </p:set>
-                                    <p:animEffect transition="in" filter="fade">
-                                      <p:cBhvr>
-                                        <p:cTn id="10" dur="250"/>
-                                        <p:tgtEl>
-                                          <p:spTgt spid="5"/>
-                                        </p:tgtEl>
-                                      </p:cBhvr>
-                                    </p:animEffect>
-                                  </p:childTnLst>
-                                </p:cTn>
-                              </p:par>
-                              <p:par>
-                                <p:cTn id="11" presetID="10" presetClass="entr" presetSubtype="0" fill="hold" nodeType="withEffect">
-                                  <p:stCondLst>
-                                    <p:cond delay="0"/>
-                                  </p:stCondLst>
-                                  <p:childTnLst>
-                                    <p:set>
-                                      <p:cBhvr>
-                                        <p:cTn id="12" dur="1" fill="hold">
-                                          <p:stCondLst>
-                                            <p:cond delay="0"/>
-                                          </p:stCondLst>
-                                        </p:cTn>
-                                        <p:tgtEl>
                                           <p:spTgt spid="7"/>
                                         </p:tgtEl>
                                         <p:attrNameLst>
@@ -9625,7 +9597,7 @@
                                     </p:set>
                                     <p:animEffect transition="in" filter="fade">
                                       <p:cBhvr>
-                                        <p:cTn id="13" dur="500"/>
+                                        <p:cTn id="10" dur="500"/>
                                         <p:tgtEl>
                                           <p:spTgt spid="7"/>
                                         </p:tgtEl>
@@ -11775,7 +11747,7 @@
       </p:grpSpPr>
       <p:sp>
         <p:nvSpPr>
-          <p:cNvPr id="73" name="Rectangle 72">
+          <p:cNvPr id="135" name="Rectangle 134">
             <a:extLst>
               <a:ext uri="{FF2B5EF4-FFF2-40B4-BE49-F238E27FC236}">
                 <a16:creationId xmlns:a16="http://schemas.microsoft.com/office/drawing/2014/main" id="{823AC064-BC96-4F32-8AE1-B2FD38754823}"/>
@@ -11840,10 +11812,10 @@
       </p:sp>
       <p:sp>
         <p:nvSpPr>
-          <p:cNvPr id="2" name="CaixaDeTexto 1">
-            <a:extLst>
-              <a:ext uri="{FF2B5EF4-FFF2-40B4-BE49-F238E27FC236}">
-                <a16:creationId xmlns:a16="http://schemas.microsoft.com/office/drawing/2014/main" id="{D1F697F4-51A4-47F8-AA5A-624A3DAE20E6}"/>
+          <p:cNvPr id="18" name="CaixaDeTexto 17">
+            <a:extLst>
+              <a:ext uri="{FF2B5EF4-FFF2-40B4-BE49-F238E27FC236}">
+                <a16:creationId xmlns:a16="http://schemas.microsoft.com/office/drawing/2014/main" id="{B513A972-1CA3-488C-A0CE-57DBD6094911}"/>
               </a:ext>
             </a:extLst>
           </p:cNvPr>
@@ -11852,7 +11824,7 @@
         </p:nvSpPr>
         <p:spPr>
           <a:xfrm>
-            <a:off x="546351" y="433545"/>
+            <a:off x="559416" y="1370974"/>
             <a:ext cx="11139854" cy="930447"/>
           </a:xfrm>
           <a:prstGeom prst="rect">
@@ -11889,7 +11861,7 @@
       </p:sp>
       <p:cxnSp>
         <p:nvCxnSpPr>
-          <p:cNvPr id="75" name="Straight Connector 74">
+          <p:cNvPr id="137" name="Straight Connector 136">
             <a:extLst>
               <a:ext uri="{FF2B5EF4-FFF2-40B4-BE49-F238E27FC236}">
                 <a16:creationId xmlns:a16="http://schemas.microsoft.com/office/drawing/2014/main" id="{7E7C77BC-7138-40B1-A15B-20F57A494629}"/>
@@ -11941,10 +11913,10 @@
       </p:cxnSp>
       <p:pic>
         <p:nvPicPr>
-          <p:cNvPr id="3076" name="Picture 4" descr="Ver a imagem de origem">
-            <a:extLst>
-              <a:ext uri="{FF2B5EF4-FFF2-40B4-BE49-F238E27FC236}">
-                <a16:creationId xmlns:a16="http://schemas.microsoft.com/office/drawing/2014/main" id="{F306B4F8-0634-40A0-98E4-7CD868BCCCDA}"/>
+          <p:cNvPr id="3074" name="Picture 2" descr="Ver a imagem de origem">
+            <a:extLst>
+              <a:ext uri="{FF2B5EF4-FFF2-40B4-BE49-F238E27FC236}">
+                <a16:creationId xmlns:a16="http://schemas.microsoft.com/office/drawing/2014/main" id="{0E56173A-9B53-46A7-9945-47CBDF00FD9E}"/>
               </a:ext>
             </a:extLst>
           </p:cNvPr>
@@ -11967,8 +11939,8 @@
         </p:blipFill>
         <p:spPr bwMode="auto">
           <a:xfrm>
-            <a:off x="7154368" y="2297658"/>
-            <a:ext cx="3997637" cy="3997637"/>
+            <a:off x="7282135" y="2942992"/>
+            <a:ext cx="3942456" cy="3151964"/>
           </a:xfrm>
           <a:prstGeom prst="rect">
             <a:avLst/>
@@ -11987,7 +11959,7 @@
       </p:pic>
       <p:cxnSp>
         <p:nvCxnSpPr>
-          <p:cNvPr id="77" name="Straight Connector 76">
+          <p:cNvPr id="139" name="Straight Connector 138">
             <a:extLst>
               <a:ext uri="{FF2B5EF4-FFF2-40B4-BE49-F238E27FC236}">
                 <a16:creationId xmlns:a16="http://schemas.microsoft.com/office/drawing/2014/main" id="{DB146403-F3D6-484B-B2ED-97F9565D0370}"/>
@@ -12037,52 +12009,55 @@
           </a:fontRef>
         </p:style>
       </p:cxnSp>
-      <p:pic>
-        <p:nvPicPr>
-          <p:cNvPr id="3074" name="Picture 2" descr="Ver a imagem de origem">
-            <a:extLst>
-              <a:ext uri="{FF2B5EF4-FFF2-40B4-BE49-F238E27FC236}">
-                <a16:creationId xmlns:a16="http://schemas.microsoft.com/office/drawing/2014/main" id="{0E56173A-9B53-46A7-9945-47CBDF00FD9E}"/>
-              </a:ext>
-            </a:extLst>
-          </p:cNvPr>
-          <p:cNvPicPr>
-            <a:picLocks noChangeAspect="1" noChangeArrowheads="1"/>
-          </p:cNvPicPr>
+      <p:sp>
+        <p:nvSpPr>
+          <p:cNvPr id="2" name="CaixaDeTexto 1">
+            <a:extLst>
+              <a:ext uri="{FF2B5EF4-FFF2-40B4-BE49-F238E27FC236}">
+                <a16:creationId xmlns:a16="http://schemas.microsoft.com/office/drawing/2014/main" id="{D1F697F4-51A4-47F8-AA5A-624A3DAE20E6}"/>
+              </a:ext>
+            </a:extLst>
+          </p:cNvPr>
+          <p:cNvSpPr txBox="1"/>
           <p:nvPr/>
-        </p:nvPicPr>
-        <p:blipFill>
-          <a:blip r:embed="rId3">
-            <a:extLst>
-              <a:ext uri="{28A0092B-C50C-407E-A947-70E740481C1C}">
-                <a14:useLocalDpi xmlns:a14="http://schemas.microsoft.com/office/drawing/2010/main" val="0"/>
-              </a:ext>
-            </a:extLst>
-          </a:blip>
-          <a:stretch>
-            <a:fillRect/>
-          </a:stretch>
-        </p:blipFill>
-        <p:spPr bwMode="auto">
+        </p:nvSpPr>
+        <p:spPr>
           <a:xfrm>
-            <a:off x="794636" y="2297658"/>
-            <a:ext cx="5000218" cy="3997637"/>
+            <a:off x="546351" y="485094"/>
+            <a:ext cx="11139854" cy="930447"/>
           </a:xfrm>
           <a:prstGeom prst="rect">
             <a:avLst/>
           </a:prstGeom>
-          <a:noFill/>
-          <a:extLst>
-            <a:ext uri="{909E8E84-426E-40DD-AFC4-6F175D3DCCD1}">
-              <a14:hiddenFill xmlns:a14="http://schemas.microsoft.com/office/drawing/2010/main">
-                <a:solidFill>
-                  <a:srgbClr val="FFFFFF"/>
-                </a:solidFill>
-              </a14:hiddenFill>
-            </a:ext>
-          </a:extLst>
         </p:spPr>
-      </p:pic>
+        <p:txBody>
+          <a:bodyPr vert="horz" lIns="91440" tIns="45720" rIns="91440" bIns="45720" rtlCol="0" anchor="b">
+            <a:normAutofit/>
+          </a:bodyPr>
+          <a:lstStyle/>
+          <a:p>
+            <a:pPr algn="ctr">
+              <a:lnSpc>
+                <a:spcPct val="90000"/>
+              </a:lnSpc>
+              <a:spcBef>
+                <a:spcPct val="0"/>
+              </a:spcBef>
+              <a:spcAft>
+                <a:spcPts val="600"/>
+              </a:spcAft>
+            </a:pPr>
+            <a:endParaRPr lang="en-US" sz="5400" dirty="0">
+              <a:solidFill>
+                <a:srgbClr val="FFFFFF"/>
+              </a:solidFill>
+              <a:latin typeface="+mj-lt"/>
+              <a:ea typeface="+mj-ea"/>
+              <a:cs typeface="+mj-cs"/>
+            </a:endParaRPr>
+          </a:p>
+        </p:txBody>
+      </p:sp>
       <p:pic>
         <p:nvPicPr>
           <p:cNvPr id="4" name="Imagem 3" descr="Logotipo&#10;&#10;Descrição gerada automaticamente">
@@ -12098,7 +12073,7 @@
           <p:nvPr/>
         </p:nvPicPr>
         <p:blipFill>
-          <a:blip r:embed="rId4">
+          <a:blip r:embed="rId3">
             <a:extLst>
               <a:ext uri="{28A0092B-C50C-407E-A947-70E740481C1C}">
                 <a14:useLocalDpi xmlns:a14="http://schemas.microsoft.com/office/drawing/2010/main" val="0"/>
@@ -12121,34 +12096,44 @@
       </p:pic>
       <p:sp>
         <p:nvSpPr>
-          <p:cNvPr id="18" name="CaixaDeTexto 17">
-            <a:extLst>
-              <a:ext uri="{FF2B5EF4-FFF2-40B4-BE49-F238E27FC236}">
-                <a16:creationId xmlns:a16="http://schemas.microsoft.com/office/drawing/2014/main" id="{B513A972-1CA3-488C-A0CE-57DBD6094911}"/>
-              </a:ext>
-            </a:extLst>
-          </p:cNvPr>
-          <p:cNvSpPr txBox="1"/>
+          <p:cNvPr id="6" name="Retângulo 5">
+            <a:extLst>
+              <a:ext uri="{FF2B5EF4-FFF2-40B4-BE49-F238E27FC236}">
+                <a16:creationId xmlns:a16="http://schemas.microsoft.com/office/drawing/2014/main" id="{0D8BCC5F-03BD-4226-916D-7D7E98F75256}"/>
+              </a:ext>
+            </a:extLst>
+          </p:cNvPr>
+          <p:cNvSpPr/>
           <p:nvPr/>
         </p:nvSpPr>
         <p:spPr>
           <a:xfrm>
-            <a:off x="1170687" y="710059"/>
-            <a:ext cx="10085518" cy="984885"/>
+            <a:off x="1544722" y="817628"/>
+            <a:ext cx="9102556" cy="590931"/>
           </a:xfrm>
           <a:prstGeom prst="rect">
             <a:avLst/>
           </a:prstGeom>
-          <a:noFill/>
         </p:spPr>
         <p:txBody>
-          <a:bodyPr wrap="none" rtlCol="0">
+          <a:bodyPr wrap="none">
             <a:spAutoFit/>
           </a:bodyPr>
           <a:lstStyle/>
           <a:p>
+            <a:pPr algn="ctr">
+              <a:lnSpc>
+                <a:spcPct val="90000"/>
+              </a:lnSpc>
+              <a:spcBef>
+                <a:spcPct val="0"/>
+              </a:spcBef>
+              <a:spcAft>
+                <a:spcPts val="600"/>
+              </a:spcAft>
+            </a:pPr>
             <a:r>
-              <a:rPr lang="en-US" sz="4000" dirty="0">
+              <a:rPr lang="en-US" sz="3600" dirty="0" err="1">
                 <a:solidFill>
                   <a:srgbClr val="FFFFFF"/>
                 </a:solidFill>
@@ -12156,14 +12141,93 @@
                 <a:ea typeface="+mj-ea"/>
                 <a:cs typeface="+mj-cs"/>
               </a:rPr>
-              <a:t>Tabelas/ Modelo de dados Lógicos</a:t>
+              <a:t>Tabelas</a:t>
             </a:r>
-          </a:p>
-          <a:p>
-            <a:endParaRPr lang="pt-BR" dirty="0"/>
+            <a:r>
+              <a:rPr lang="en-US" sz="3600" dirty="0">
+                <a:solidFill>
+                  <a:srgbClr val="FFFFFF"/>
+                </a:solidFill>
+                <a:latin typeface="Felix Titling" panose="04060505060202020A04" pitchFamily="82" charset="0"/>
+                <a:ea typeface="+mj-ea"/>
+                <a:cs typeface="+mj-cs"/>
+              </a:rPr>
+              <a:t>/ </a:t>
+            </a:r>
+            <a:r>
+              <a:rPr lang="en-US" sz="3600" dirty="0" err="1">
+                <a:solidFill>
+                  <a:srgbClr val="FFFFFF"/>
+                </a:solidFill>
+                <a:latin typeface="Felix Titling" panose="04060505060202020A04" pitchFamily="82" charset="0"/>
+                <a:ea typeface="+mj-ea"/>
+                <a:cs typeface="+mj-cs"/>
+              </a:rPr>
+              <a:t>Modelo</a:t>
+            </a:r>
+            <a:r>
+              <a:rPr lang="en-US" sz="3600" dirty="0">
+                <a:solidFill>
+                  <a:srgbClr val="FFFFFF"/>
+                </a:solidFill>
+                <a:latin typeface="Felix Titling" panose="04060505060202020A04" pitchFamily="82" charset="0"/>
+                <a:ea typeface="+mj-ea"/>
+                <a:cs typeface="+mj-cs"/>
+              </a:rPr>
+              <a:t> de dados </a:t>
+            </a:r>
+            <a:r>
+              <a:rPr lang="en-US" sz="3600" dirty="0" err="1">
+                <a:solidFill>
+                  <a:srgbClr val="FFFFFF"/>
+                </a:solidFill>
+                <a:latin typeface="Felix Titling" panose="04060505060202020A04" pitchFamily="82" charset="0"/>
+                <a:ea typeface="+mj-ea"/>
+                <a:cs typeface="+mj-cs"/>
+              </a:rPr>
+              <a:t>Lógicos</a:t>
+            </a:r>
+            <a:endParaRPr lang="en-US" sz="3600" dirty="0">
+              <a:solidFill>
+                <a:srgbClr val="FFFFFF"/>
+              </a:solidFill>
+              <a:latin typeface="Felix Titling" panose="04060505060202020A04" pitchFamily="82" charset="0"/>
+              <a:ea typeface="+mj-ea"/>
+              <a:cs typeface="+mj-cs"/>
+            </a:endParaRPr>
           </a:p>
         </p:txBody>
       </p:sp>
+      <p:pic>
+        <p:nvPicPr>
+          <p:cNvPr id="7" name="Imagem 6">
+            <a:extLst>
+              <a:ext uri="{FF2B5EF4-FFF2-40B4-BE49-F238E27FC236}">
+                <a16:creationId xmlns:a16="http://schemas.microsoft.com/office/drawing/2014/main" id="{FB4C0EF8-F325-420E-ADAB-72BB9D095E23}"/>
+              </a:ext>
+            </a:extLst>
+          </p:cNvPr>
+          <p:cNvPicPr>
+            <a:picLocks noChangeAspect="1"/>
+          </p:cNvPicPr>
+          <p:nvPr/>
+        </p:nvPicPr>
+        <p:blipFill>
+          <a:blip r:embed="rId4"/>
+          <a:stretch>
+            <a:fillRect/>
+          </a:stretch>
+        </p:blipFill>
+        <p:spPr>
+          <a:xfrm>
+            <a:off x="326741" y="2308403"/>
+            <a:ext cx="5607494" cy="4294758"/>
+          </a:xfrm>
+          <a:prstGeom prst="rect">
+            <a:avLst/>
+          </a:prstGeom>
+        </p:spPr>
+      </p:pic>
     </p:spTree>
     <p:extLst>
       <p:ext uri="{BB962C8B-B14F-4D97-AF65-F5344CB8AC3E}">
@@ -12317,7 +12381,7 @@
                                           </p:stCondLst>
                                         </p:cTn>
                                         <p:tgtEl>
-                                          <p:spTgt spid="3076"/>
+                                          <p:spTgt spid="7"/>
                                         </p:tgtEl>
                                         <p:attrNameLst>
                                           <p:attrName>style.visibility</p:attrName>

</xml_diff>